<commit_message>
finished mod6 packaging and debugging
</commit_message>
<xml_diff>
--- a/slides/COP2073C-Module6.pptx
+++ b/slides/COP2073C-Module6.pptx
@@ -339,7 +339,7 @@
           <a:p>
             <a:fld id="{2A37B5DA-8E33-465E-AA6E-3D89F39FC24F}" type="datetimeFigureOut">
               <a:rPr lang="en-US" smtClean="0"/>
-              <a:t>12/13/2022</a:t>
+              <a:t>1/3/2023</a:t>
             </a:fld>
             <a:endParaRPr lang="en-US"/>
           </a:p>
@@ -13228,7 +13228,9 @@
           </a:xfrm>
         </p:spPr>
         <p:txBody>
-          <a:bodyPr/>
+          <a:bodyPr>
+            <a:normAutofit/>
+          </a:bodyPr>
           <a:lstStyle/>
           <a:p>
             <a:r>
@@ -13276,18 +13278,16 @@
           </a:p>
           <a:p>
             <a:r>
-              <a:rPr lang="en-US" dirty="0"/>
-              <a:t>This indicates that the two packages each have an object with the same name of "ellipse".</a:t>
+              <a:rPr lang="en-US"/>
+              <a:t>This warning indicates that the two packages each have an object with the same name of "ellipse".  </a:t>
             </a:r>
           </a:p>
           <a:p>
             <a:pPr lvl="1"/>
             <a:r>
-              <a:rPr lang="en-US" dirty="0"/>
+              <a:rPr lang="en-US"/>
               <a:t>R notifies you that the object masked (aka shadowed"), use package::object to access it</a:t>
             </a:r>
-          </a:p>
-          <a:p>
             <a:endParaRPr lang="en-US" dirty="0"/>
           </a:p>
         </p:txBody>
@@ -14403,40 +14403,6 @@
           </a:extLst>
         </p:spPr>
       </p:pic>
-      <p:sp>
-        <p:nvSpPr>
-          <p:cNvPr id="3" name="Rectangle 2">
-            <a:extLst>
-              <a:ext uri="{FF2B5EF4-FFF2-40B4-BE49-F238E27FC236}">
-                <a16:creationId xmlns:a16="http://schemas.microsoft.com/office/drawing/2014/main" id="{AD4E0B48-4DE8-4B62-BCEA-EBD6E0228306}"/>
-              </a:ext>
-            </a:extLst>
-          </p:cNvPr>
-          <p:cNvSpPr/>
-          <p:nvPr/>
-        </p:nvSpPr>
-        <p:spPr>
-          <a:xfrm>
-            <a:off x="2483526" y="5959377"/>
-            <a:ext cx="6174092" cy="338554"/>
-          </a:xfrm>
-          <a:prstGeom prst="rect">
-            <a:avLst/>
-          </a:prstGeom>
-        </p:spPr>
-        <p:txBody>
-          <a:bodyPr wrap="square">
-            <a:spAutoFit/>
-          </a:bodyPr>
-          <a:lstStyle/>
-          <a:p>
-            <a:r>
-              <a:rPr lang="en-US" sz="1600" dirty="0"/>
-              <a:t>https://methodsblog.com/2015/11/30/building-your-first-r-package/</a:t>
-            </a:r>
-          </a:p>
-        </p:txBody>
-      </p:sp>
     </p:spTree>
     <p:extLst>
       <p:ext uri="{BB962C8B-B14F-4D97-AF65-F5344CB8AC3E}">
@@ -16173,9 +16139,10 @@
           <a:lstStyle/>
           <a:p>
             <a:r>
-              <a:rPr lang="en-US" dirty="0"/>
-              <a:t>Diagnosing</a:t>
-            </a:r>
+              <a:rPr lang="en-US"/>
+              <a:t>Diagnosing Problems</a:t>
+            </a:r>
+            <a:endParaRPr lang="en-US" dirty="0"/>
           </a:p>
         </p:txBody>
       </p:sp>
@@ -19371,7 +19338,7 @@
         <p:spPr>
           <a:xfrm>
             <a:off x="719625" y="1549543"/>
-            <a:ext cx="9836039" cy="4093428"/>
+            <a:ext cx="9836039" cy="5016758"/>
           </a:xfrm>
           <a:prstGeom prst="rect">
             <a:avLst/>
@@ -19389,24 +19356,61 @@
           <a:lstStyle/>
           <a:p>
             <a:r>
+              <a:rPr lang="en-US" sz="2000">
+                <a:latin typeface="Courier New" panose="02070309020205020404" pitchFamily="49" charset="0"/>
+                <a:cs typeface="Courier New" panose="02070309020205020404" pitchFamily="49" charset="0"/>
+              </a:rPr>
+              <a:t>&gt; myfibvectorTRY </a:t>
+            </a:r>
+            <a:r>
+              <a:rPr lang="en-US" sz="2000" dirty="0">
+                <a:latin typeface="Courier New" panose="02070309020205020404" pitchFamily="49" charset="0"/>
+                <a:cs typeface="Courier New" panose="02070309020205020404" pitchFamily="49" charset="0"/>
+              </a:rPr>
+              <a:t>&lt;- function(</a:t>
+            </a:r>
+            <a:r>
               <a:rPr lang="en-US" sz="2000" dirty="0" err="1">
                 <a:latin typeface="Courier New" panose="02070309020205020404" pitchFamily="49" charset="0"/>
                 <a:cs typeface="Courier New" panose="02070309020205020404" pitchFamily="49" charset="0"/>
               </a:rPr>
-              <a:t>myfibvectorTRY</a:t>
+              <a:t>nvec</a:t>
             </a:r>
             <a:r>
               <a:rPr lang="en-US" sz="2000" dirty="0">
                 <a:latin typeface="Courier New" panose="02070309020205020404" pitchFamily="49" charset="0"/>
                 <a:cs typeface="Courier New" panose="02070309020205020404" pitchFamily="49" charset="0"/>
               </a:rPr>
-              <a:t> &lt;- function(</a:t>
+              <a:t>) {</a:t>
+            </a:r>
+          </a:p>
+          <a:p>
+            <a:r>
+              <a:rPr lang="en-US" sz="2000" dirty="0">
+                <a:latin typeface="Courier New" panose="02070309020205020404" pitchFamily="49" charset="0"/>
+                <a:cs typeface="Courier New" panose="02070309020205020404" pitchFamily="49" charset="0"/>
+              </a:rPr>
+              <a:t>          </a:t>
             </a:r>
             <a:r>
               <a:rPr lang="en-US" sz="2000" dirty="0" err="1">
                 <a:latin typeface="Courier New" panose="02070309020205020404" pitchFamily="49" charset="0"/>
                 <a:cs typeface="Courier New" panose="02070309020205020404" pitchFamily="49" charset="0"/>
               </a:rPr>
+              <a:t>nterms</a:t>
+            </a:r>
+            <a:r>
+              <a:rPr lang="en-US" sz="2000" dirty="0">
+                <a:latin typeface="Courier New" panose="02070309020205020404" pitchFamily="49" charset="0"/>
+                <a:cs typeface="Courier New" panose="02070309020205020404" pitchFamily="49" charset="0"/>
+              </a:rPr>
+              <a:t> &lt;- length(</a:t>
+            </a:r>
+            <a:r>
+              <a:rPr lang="en-US" sz="2000" dirty="0" err="1">
+                <a:latin typeface="Courier New" panose="02070309020205020404" pitchFamily="49" charset="0"/>
+                <a:cs typeface="Courier New" panose="02070309020205020404" pitchFamily="49" charset="0"/>
+              </a:rPr>
               <a:t>nvec</a:t>
             </a:r>
             <a:r>
@@ -19414,7 +19418,7 @@
                 <a:latin typeface="Courier New" panose="02070309020205020404" pitchFamily="49" charset="0"/>
                 <a:cs typeface="Courier New" panose="02070309020205020404" pitchFamily="49" charset="0"/>
               </a:rPr>
-              <a:t>) {</a:t>
+              <a:t>)</a:t>
             </a:r>
           </a:p>
           <a:p>
@@ -19423,35 +19427,64 @@
                 <a:latin typeface="Courier New" panose="02070309020205020404" pitchFamily="49" charset="0"/>
                 <a:cs typeface="Courier New" panose="02070309020205020404" pitchFamily="49" charset="0"/>
               </a:rPr>
-              <a:t>          </a:t>
-            </a:r>
-            <a:r>
-              <a:rPr lang="en-US" sz="2000" dirty="0" err="1">
-                <a:latin typeface="Courier New" panose="02070309020205020404" pitchFamily="49" charset="0"/>
-                <a:cs typeface="Courier New" panose="02070309020205020404" pitchFamily="49" charset="0"/>
-              </a:rPr>
-              <a:t>nterms</a:t>
-            </a:r>
+              <a:t>          result &lt;- rep(0,nterms)</a:t>
+            </a:r>
+          </a:p>
+          <a:p>
             <a:r>
               <a:rPr lang="en-US" sz="2000" dirty="0">
                 <a:latin typeface="Courier New" panose="02070309020205020404" pitchFamily="49" charset="0"/>
                 <a:cs typeface="Courier New" panose="02070309020205020404" pitchFamily="49" charset="0"/>
               </a:rPr>
-              <a:t> &lt;- length(</a:t>
-            </a:r>
-            <a:r>
-              <a:rPr lang="en-US" sz="2000" dirty="0" err="1">
+              <a:t>          for (i in 1:nterms) {</a:t>
+            </a:r>
+          </a:p>
+          <a:p>
+            <a:r>
+              <a:rPr lang="en-US" sz="2000" dirty="0">
+                <a:latin typeface="Courier New" panose="02070309020205020404" pitchFamily="49" charset="0"/>
+                <a:cs typeface="Courier New" panose="02070309020205020404" pitchFamily="49" charset="0"/>
+              </a:rPr>
+              <a:t>                  attempt &lt;- </a:t>
+            </a:r>
+            <a:r>
+              <a:rPr lang="en-US" sz="2000" b="1" dirty="0">
+                <a:latin typeface="Courier New" panose="02070309020205020404" pitchFamily="49" charset="0"/>
+                <a:cs typeface="Courier New" panose="02070309020205020404" pitchFamily="49" charset="0"/>
+              </a:rPr>
+              <a:t>try(myfibrec2(</a:t>
+            </a:r>
+            <a:r>
+              <a:rPr lang="en-US" sz="2000" b="1" dirty="0" err="1">
                 <a:latin typeface="Courier New" panose="02070309020205020404" pitchFamily="49" charset="0"/>
                 <a:cs typeface="Courier New" panose="02070309020205020404" pitchFamily="49" charset="0"/>
               </a:rPr>
               <a:t>nvec</a:t>
             </a:r>
             <a:r>
+              <a:rPr lang="en-US" sz="2000" b="1" dirty="0">
+                <a:latin typeface="Courier New" panose="02070309020205020404" pitchFamily="49" charset="0"/>
+                <a:cs typeface="Courier New" panose="02070309020205020404" pitchFamily="49" charset="0"/>
+              </a:rPr>
+              <a:t>[i]),silent=T)</a:t>
+            </a:r>
+          </a:p>
+          <a:p>
+            <a:r>
+              <a:rPr lang="en-US" sz="2000" b="1" dirty="0">
+                <a:latin typeface="Courier New" panose="02070309020205020404" pitchFamily="49" charset="0"/>
+                <a:cs typeface="Courier New" panose="02070309020205020404" pitchFamily="49" charset="0"/>
+              </a:rPr>
+              <a:t>                  if (class(attempt)=="try-error") {</a:t>
+            </a:r>
+          </a:p>
+          <a:p>
+            <a:r>
               <a:rPr lang="en-US" sz="2000" dirty="0">
                 <a:latin typeface="Courier New" panose="02070309020205020404" pitchFamily="49" charset="0"/>
                 <a:cs typeface="Courier New" panose="02070309020205020404" pitchFamily="49" charset="0"/>
               </a:rPr>
-              <a:t>)</a:t>
+              <a:t>                          result[i] &lt;- NA</a:t>
             </a:r>
           </a:p>
           <a:p>
@@ -19460,7 +19493,7 @@
                 <a:latin typeface="Courier New" panose="02070309020205020404" pitchFamily="49" charset="0"/>
                 <a:cs typeface="Courier New" panose="02070309020205020404" pitchFamily="49" charset="0"/>
               </a:rPr>
-              <a:t>          result &lt;- rep(0,nterms)</a:t>
+              <a:t>                  } else {</a:t>
             </a:r>
           </a:p>
           <a:p>
@@ -19469,7 +19502,7 @@
                 <a:latin typeface="Courier New" panose="02070309020205020404" pitchFamily="49" charset="0"/>
                 <a:cs typeface="Courier New" panose="02070309020205020404" pitchFamily="49" charset="0"/>
               </a:rPr>
-              <a:t>          for (i in 1:nterms) {</a:t>
+              <a:t>                          result[i] &lt;- attempt</a:t>
             </a:r>
           </a:p>
           <a:p>
@@ -19478,37 +19511,7 @@
                 <a:latin typeface="Courier New" panose="02070309020205020404" pitchFamily="49" charset="0"/>
                 <a:cs typeface="Courier New" panose="02070309020205020404" pitchFamily="49" charset="0"/>
               </a:rPr>
-              <a:t>                  attempt &lt;- </a:t>
-            </a:r>
-            <a:r>
-              <a:rPr lang="en-US" sz="2000" b="1" dirty="0">
-                <a:latin typeface="Courier New" panose="02070309020205020404" pitchFamily="49" charset="0"/>
-                <a:cs typeface="Courier New" panose="02070309020205020404" pitchFamily="49" charset="0"/>
-              </a:rPr>
-              <a:t>try(myfibrec2(</a:t>
-            </a:r>
-            <a:r>
-              <a:rPr lang="en-US" sz="2000" b="1" dirty="0" err="1">
-                <a:latin typeface="Courier New" panose="02070309020205020404" pitchFamily="49" charset="0"/>
-                <a:cs typeface="Courier New" panose="02070309020205020404" pitchFamily="49" charset="0"/>
-              </a:rPr>
-              <a:t>nvec</a:t>
-            </a:r>
-            <a:r>
-              <a:rPr lang="en-US" sz="2000" b="1" dirty="0">
-                <a:latin typeface="Courier New" panose="02070309020205020404" pitchFamily="49" charset="0"/>
-                <a:cs typeface="Courier New" panose="02070309020205020404" pitchFamily="49" charset="0"/>
-              </a:rPr>
-              <a:t>[i]),silent=T)</a:t>
-            </a:r>
-          </a:p>
-          <a:p>
-            <a:r>
-              <a:rPr lang="en-US" sz="2000" b="1" dirty="0">
-                <a:latin typeface="Courier New" panose="02070309020205020404" pitchFamily="49" charset="0"/>
-                <a:cs typeface="Courier New" panose="02070309020205020404" pitchFamily="49" charset="0"/>
-              </a:rPr>
-              <a:t>                  if (class(attempt)=="try-error") {</a:t>
+              <a:t>                  }</a:t>
             </a:r>
           </a:p>
           <a:p>
@@ -19517,7 +19520,7 @@
                 <a:latin typeface="Courier New" panose="02070309020205020404" pitchFamily="49" charset="0"/>
                 <a:cs typeface="Courier New" panose="02070309020205020404" pitchFamily="49" charset="0"/>
               </a:rPr>
-              <a:t>                          result[i] &lt;- NA</a:t>
+              <a:t>          }</a:t>
             </a:r>
           </a:p>
           <a:p>
@@ -19526,53 +19529,45 @@
                 <a:latin typeface="Courier New" panose="02070309020205020404" pitchFamily="49" charset="0"/>
                 <a:cs typeface="Courier New" panose="02070309020205020404" pitchFamily="49" charset="0"/>
               </a:rPr>
-              <a:t>                  } else {</a:t>
-            </a:r>
-          </a:p>
-          <a:p>
-            <a:r>
-              <a:rPr lang="en-US" sz="2000" dirty="0">
-                <a:latin typeface="Courier New" panose="02070309020205020404" pitchFamily="49" charset="0"/>
-                <a:cs typeface="Courier New" panose="02070309020205020404" pitchFamily="49" charset="0"/>
-              </a:rPr>
-              <a:t>                          result[i] &lt;- attempt</a:t>
-            </a:r>
-          </a:p>
-          <a:p>
-            <a:r>
-              <a:rPr lang="en-US" sz="2000" dirty="0">
-                <a:latin typeface="Courier New" panose="02070309020205020404" pitchFamily="49" charset="0"/>
-                <a:cs typeface="Courier New" panose="02070309020205020404" pitchFamily="49" charset="0"/>
-              </a:rPr>
-              <a:t>                  }</a:t>
-            </a:r>
-          </a:p>
-          <a:p>
-            <a:r>
-              <a:rPr lang="en-US" sz="2000" dirty="0">
-                <a:latin typeface="Courier New" panose="02070309020205020404" pitchFamily="49" charset="0"/>
-                <a:cs typeface="Courier New" panose="02070309020205020404" pitchFamily="49" charset="0"/>
-              </a:rPr>
-              <a:t>          }</a:t>
-            </a:r>
-          </a:p>
-          <a:p>
-            <a:r>
-              <a:rPr lang="en-US" sz="2000" dirty="0">
-                <a:latin typeface="Courier New" panose="02070309020205020404" pitchFamily="49" charset="0"/>
-                <a:cs typeface="Courier New" panose="02070309020205020404" pitchFamily="49" charset="0"/>
-              </a:rPr>
               <a:t>          return(result)</a:t>
             </a:r>
           </a:p>
           <a:p>
             <a:r>
-              <a:rPr lang="en-US" sz="2000" dirty="0">
+              <a:rPr lang="en-US" sz="2000">
                 <a:latin typeface="Courier New" panose="02070309020205020404" pitchFamily="49" charset="0"/>
                 <a:cs typeface="Courier New" panose="02070309020205020404" pitchFamily="49" charset="0"/>
               </a:rPr>
               <a:t>}</a:t>
             </a:r>
+          </a:p>
+          <a:p>
+            <a:endParaRPr lang="en-US" sz="2000">
+              <a:latin typeface="Courier New" panose="02070309020205020404" pitchFamily="49" charset="0"/>
+              <a:cs typeface="Courier New" panose="02070309020205020404" pitchFamily="49" charset="0"/>
+            </a:endParaRPr>
+          </a:p>
+          <a:p>
+            <a:r>
+              <a:rPr lang="en-US" sz="2000">
+                <a:latin typeface="Courier New" panose="02070309020205020404" pitchFamily="49" charset="0"/>
+                <a:cs typeface="Courier New" panose="02070309020205020404" pitchFamily="49" charset="0"/>
+              </a:rPr>
+              <a:t>&gt; myfibvectorTRY(0)</a:t>
+            </a:r>
+          </a:p>
+          <a:p>
+            <a:r>
+              <a:rPr lang="en-US" sz="2000">
+                <a:latin typeface="Courier New" panose="02070309020205020404" pitchFamily="49" charset="0"/>
+                <a:cs typeface="Courier New" panose="02070309020205020404" pitchFamily="49" charset="0"/>
+              </a:rPr>
+              <a:t>[1] NA</a:t>
+            </a:r>
+            <a:endParaRPr lang="en-US" sz="2000" dirty="0">
+              <a:latin typeface="Courier New" panose="02070309020205020404" pitchFamily="49" charset="0"/>
+              <a:cs typeface="Courier New" panose="02070309020205020404" pitchFamily="49" charset="0"/>
+            </a:endParaRPr>
           </a:p>
         </p:txBody>
       </p:sp>
@@ -19633,8 +19628,16 @@
           <a:lstStyle/>
           <a:p>
             <a:r>
+              <a:rPr lang="en-US" dirty="0"/>
+              <a:t>s</a:t>
+            </a:r>
+            <a:r>
+              <a:rPr lang="en-US"/>
+              <a:t>ystem</a:t>
+            </a:r>
+            <a:r>
               <a:rPr lang="en-US" dirty="0" err="1"/>
-              <a:t>System.time</a:t>
+              <a:t>.time</a:t>
             </a:r>
             <a:endParaRPr lang="en-US" dirty="0"/>
           </a:p>
@@ -19694,24 +19697,28 @@
           </a:p>
           <a:p>
             <a:r>
-              <a:rPr lang="en-US" sz="3200" dirty="0"/>
-              <a:t>Compare </a:t>
+              <a:rPr lang="en-US" sz="3200"/>
+              <a:t>Compare the abs</a:t>
             </a:r>
             <a:r>
               <a:rPr lang="en-US" sz="3200" dirty="0" err="1"/>
-              <a:t>abs_loop</a:t>
+              <a:t>_loop</a:t>
             </a:r>
             <a:r>
               <a:rPr lang="en-US" sz="3200" dirty="0"/>
               <a:t> and </a:t>
             </a:r>
             <a:r>
-              <a:rPr lang="en-US" sz="3200" dirty="0" err="1"/>
-              <a:t>abs_set</a:t>
+              <a:rPr lang="en-US" sz="3200" err="1"/>
+              <a:t>abs</a:t>
+            </a:r>
+            <a:r>
+              <a:rPr lang="en-US" sz="3200"/>
+              <a:t>_vec functions (from "Conditions and Loops" earlier in this module) </a:t>
             </a:r>
             <a:r>
               <a:rPr lang="en-US" sz="3200" dirty="0"/>
-              <a:t> (slides 22/23) by making a long vector of 100 million positive and negative numbers</a:t>
+              <a:t>by making a long vector of 100 million positive and negative numbers</a:t>
             </a:r>
           </a:p>
           <a:p>
@@ -20210,8 +20217,8 @@
         </p:nvSpPr>
         <p:spPr>
           <a:xfrm>
-            <a:off x="836579" y="1347020"/>
-            <a:ext cx="8764621" cy="5129981"/>
+            <a:off x="836579" y="1347021"/>
+            <a:ext cx="8764621" cy="4247380"/>
           </a:xfrm>
         </p:spPr>
         <p:txBody>
@@ -20224,7 +20231,7 @@
               <a:buNone/>
             </a:pPr>
             <a:r>
-              <a:rPr lang="en-US" sz="2800" dirty="0">
+              <a:rPr lang="en-US" sz="2800">
                 <a:latin typeface="Courier New" panose="02070309020205020404" pitchFamily="49" charset="0"/>
                 <a:cs typeface="Courier New" panose="02070309020205020404" pitchFamily="49" charset="0"/>
               </a:rPr>
@@ -20235,49 +20242,24 @@
             <a:pPr marL="457200" indent="0">
               <a:buNone/>
             </a:pPr>
-            <a:endParaRPr lang="en-US" sz="2800" dirty="0">
-              <a:latin typeface="Courier New" panose="02070309020205020404" pitchFamily="49" charset="0"/>
-              <a:cs typeface="Courier New" panose="02070309020205020404" pitchFamily="49" charset="0"/>
-            </a:endParaRPr>
+            <a:r>
+              <a:rPr lang="en-US" sz="2800">
+                <a:latin typeface="Courier New" panose="02070309020205020404" pitchFamily="49" charset="0"/>
+                <a:cs typeface="Courier New" panose="02070309020205020404" pitchFamily="49" charset="0"/>
+              </a:rPr>
+              <a:t>&gt; system.time(abs_loop(long))</a:t>
+            </a:r>
           </a:p>
           <a:p>
             <a:pPr marL="457200" indent="0">
               <a:buNone/>
             </a:pPr>
             <a:r>
-              <a:rPr lang="en-US" sz="2800" dirty="0">
-                <a:latin typeface="Courier New" panose="02070309020205020404" pitchFamily="49" charset="0"/>
-                <a:cs typeface="Courier New" panose="02070309020205020404" pitchFamily="49" charset="0"/>
-              </a:rPr>
-              <a:t>&gt; </a:t>
-            </a:r>
-            <a:r>
-              <a:rPr lang="en-US" sz="2800" dirty="0" err="1">
-                <a:latin typeface="Courier New" panose="02070309020205020404" pitchFamily="49" charset="0"/>
-                <a:cs typeface="Courier New" panose="02070309020205020404" pitchFamily="49" charset="0"/>
-              </a:rPr>
-              <a:t>system.time</a:t>
-            </a:r>
-            <a:r>
-              <a:rPr lang="en-US" sz="2800" dirty="0">
-                <a:latin typeface="Courier New" panose="02070309020205020404" pitchFamily="49" charset="0"/>
-                <a:cs typeface="Courier New" panose="02070309020205020404" pitchFamily="49" charset="0"/>
-              </a:rPr>
-              <a:t>(</a:t>
-            </a:r>
-            <a:r>
-              <a:rPr lang="en-US" sz="2800" dirty="0" err="1">
-                <a:latin typeface="Courier New" panose="02070309020205020404" pitchFamily="49" charset="0"/>
-                <a:cs typeface="Courier New" panose="02070309020205020404" pitchFamily="49" charset="0"/>
-              </a:rPr>
-              <a:t>abs_loop</a:t>
-            </a:r>
-            <a:r>
-              <a:rPr lang="en-US" sz="2800" dirty="0">
-                <a:latin typeface="Courier New" panose="02070309020205020404" pitchFamily="49" charset="0"/>
-                <a:cs typeface="Courier New" panose="02070309020205020404" pitchFamily="49" charset="0"/>
-              </a:rPr>
-              <a:t>(long))</a:t>
+              <a:rPr lang="en-US" sz="2800">
+                <a:latin typeface="Courier New" panose="02070309020205020404" pitchFamily="49" charset="0"/>
+                <a:cs typeface="Courier New" panose="02070309020205020404" pitchFamily="49" charset="0"/>
+              </a:rPr>
+              <a:t>   user  system elapsed </a:t>
             </a:r>
           </a:p>
           <a:p>
@@ -20285,7 +20267,31 @@
               <a:buNone/>
             </a:pPr>
             <a:r>
-              <a:rPr lang="en-US" sz="2800" dirty="0">
+              <a:rPr lang="en-US" sz="2800">
+                <a:latin typeface="Courier New" panose="02070309020205020404" pitchFamily="49" charset="0"/>
+                <a:cs typeface="Courier New" panose="02070309020205020404" pitchFamily="49" charset="0"/>
+              </a:rPr>
+              <a:t>   3.61    0.07    3.69 </a:t>
+            </a:r>
+          </a:p>
+          <a:p>
+            <a:pPr marL="457200" indent="0">
+              <a:buNone/>
+            </a:pPr>
+            <a:r>
+              <a:rPr lang="en-US" sz="2800">
+                <a:latin typeface="Courier New" panose="02070309020205020404" pitchFamily="49" charset="0"/>
+                <a:cs typeface="Courier New" panose="02070309020205020404" pitchFamily="49" charset="0"/>
+              </a:rPr>
+              <a:t>&gt; system.time(abs_vec(long))</a:t>
+            </a:r>
+          </a:p>
+          <a:p>
+            <a:pPr marL="457200" indent="0">
+              <a:buNone/>
+            </a:pPr>
+            <a:r>
+              <a:rPr lang="en-US" sz="2800">
                 <a:latin typeface="Courier New" panose="02070309020205020404" pitchFamily="49" charset="0"/>
                 <a:cs typeface="Courier New" panose="02070309020205020404" pitchFamily="49" charset="0"/>
               </a:rPr>
@@ -20297,84 +20303,11 @@
               <a:buNone/>
             </a:pPr>
             <a:r>
-              <a:rPr lang="en-US" sz="2800" dirty="0">
-                <a:latin typeface="Courier New" panose="02070309020205020404" pitchFamily="49" charset="0"/>
-                <a:cs typeface="Courier New" panose="02070309020205020404" pitchFamily="49" charset="0"/>
-              </a:rPr>
-              <a:t>  11.23    0.27   11.50 </a:t>
-            </a:r>
-          </a:p>
-          <a:p>
-            <a:pPr marL="457200" indent="0">
-              <a:buNone/>
-            </a:pPr>
-            <a:endParaRPr lang="en-US" sz="2800" dirty="0">
-              <a:latin typeface="Courier New" panose="02070309020205020404" pitchFamily="49" charset="0"/>
-              <a:cs typeface="Courier New" panose="02070309020205020404" pitchFamily="49" charset="0"/>
-            </a:endParaRPr>
-          </a:p>
-          <a:p>
-            <a:pPr marL="457200" indent="0">
-              <a:buNone/>
-            </a:pPr>
-            <a:r>
-              <a:rPr lang="en-US" sz="2800" dirty="0">
-                <a:latin typeface="Courier New" panose="02070309020205020404" pitchFamily="49" charset="0"/>
-                <a:cs typeface="Courier New" panose="02070309020205020404" pitchFamily="49" charset="0"/>
-              </a:rPr>
-              <a:t>&gt; </a:t>
-            </a:r>
-            <a:r>
-              <a:rPr lang="en-US" sz="2800" dirty="0" err="1">
-                <a:latin typeface="Courier New" panose="02070309020205020404" pitchFamily="49" charset="0"/>
-                <a:cs typeface="Courier New" panose="02070309020205020404" pitchFamily="49" charset="0"/>
-              </a:rPr>
-              <a:t>system.time</a:t>
-            </a:r>
-            <a:r>
-              <a:rPr lang="en-US" sz="2800" dirty="0">
-                <a:latin typeface="Courier New" panose="02070309020205020404" pitchFamily="49" charset="0"/>
-                <a:cs typeface="Courier New" panose="02070309020205020404" pitchFamily="49" charset="0"/>
-              </a:rPr>
-              <a:t>(</a:t>
-            </a:r>
-            <a:r>
-              <a:rPr lang="en-US" sz="2800" dirty="0" err="1">
-                <a:latin typeface="Courier New" panose="02070309020205020404" pitchFamily="49" charset="0"/>
-                <a:cs typeface="Courier New" panose="02070309020205020404" pitchFamily="49" charset="0"/>
-              </a:rPr>
-              <a:t>abs_sets</a:t>
-            </a:r>
-            <a:r>
-              <a:rPr lang="en-US" sz="2800" dirty="0">
-                <a:latin typeface="Courier New" panose="02070309020205020404" pitchFamily="49" charset="0"/>
-                <a:cs typeface="Courier New" panose="02070309020205020404" pitchFamily="49" charset="0"/>
-              </a:rPr>
-              <a:t>(long))</a:t>
-            </a:r>
-          </a:p>
-          <a:p>
-            <a:pPr marL="457200" indent="0">
-              <a:buNone/>
-            </a:pPr>
-            <a:r>
-              <a:rPr lang="en-US" sz="2800" dirty="0">
-                <a:latin typeface="Courier New" panose="02070309020205020404" pitchFamily="49" charset="0"/>
-                <a:cs typeface="Courier New" panose="02070309020205020404" pitchFamily="49" charset="0"/>
-              </a:rPr>
-              <a:t>   user  system elapsed </a:t>
-            </a:r>
-          </a:p>
-          <a:p>
-            <a:pPr marL="457200" indent="0">
-              <a:buNone/>
-            </a:pPr>
-            <a:r>
-              <a:rPr lang="en-US" sz="2800" dirty="0">
-                <a:latin typeface="Courier New" panose="02070309020205020404" pitchFamily="49" charset="0"/>
-                <a:cs typeface="Courier New" panose="02070309020205020404" pitchFamily="49" charset="0"/>
-              </a:rPr>
-              <a:t>   1.67    0.43    2.11</a:t>
+              <a:rPr lang="en-US" sz="2800">
+                <a:latin typeface="Courier New" panose="02070309020205020404" pitchFamily="49" charset="0"/>
+                <a:cs typeface="Courier New" panose="02070309020205020404" pitchFamily="49" charset="0"/>
+              </a:rPr>
+              <a:t>   1.03    0.21    1.23</a:t>
             </a:r>
             <a:endParaRPr lang="en-US" sz="2400" dirty="0">
               <a:latin typeface="Courier New" panose="02070309020205020404" pitchFamily="49" charset="0"/>
@@ -20515,7 +20448,7 @@
         </p:spPr>
         <p:txBody>
           <a:bodyPr>
-            <a:normAutofit fontScale="92500" lnSpcReduction="10000"/>
+            <a:normAutofit lnSpcReduction="10000"/>
           </a:bodyPr>
           <a:lstStyle/>
           <a:p>
@@ -20559,31 +20492,19 @@
           <a:p>
             <a:pPr marL="641668" lvl="1" indent="-225425"/>
             <a:r>
+              <a:rPr lang="en-US" sz="2600"/>
+              <a:t>The results show that abs_vec calculated the absolute value much faster than abs_loop</a:t>
+            </a:r>
+          </a:p>
+          <a:p>
+            <a:pPr marL="641668" lvl="1" indent="-225425"/>
+            <a:r>
+              <a:rPr lang="en-US" sz="2600"/>
+              <a:t>You </a:t>
+            </a:r>
+            <a:r>
               <a:rPr lang="en-US" sz="2600" dirty="0"/>
-              <a:t>The results show that </a:t>
-            </a:r>
-            <a:r>
-              <a:rPr lang="en-US" sz="2600" dirty="0" err="1"/>
-              <a:t>abs_set</a:t>
-            </a:r>
-            <a:r>
-              <a:rPr lang="en-US" sz="2600" dirty="0"/>
-              <a:t> calculated the absolute value 5 times faster than </a:t>
-            </a:r>
-            <a:r>
-              <a:rPr lang="en-US" sz="2600" dirty="0" err="1"/>
-              <a:t>abs_loop</a:t>
-            </a:r>
-            <a:r>
-              <a:rPr lang="en-US" sz="2600" dirty="0"/>
-              <a:t> when applied to a vector of 100 million numbers</a:t>
-            </a:r>
-          </a:p>
-          <a:p>
-            <a:pPr marL="641668" lvl="1" indent="-225425"/>
-            <a:r>
-              <a:rPr lang="en-US" sz="2600" dirty="0"/>
-              <a:t>You can expect similar speed-ups whenever you write vectorized code.</a:t>
+              <a:t>can expect similar speed-ups whenever you write vectorized code.</a:t>
             </a:r>
             <a:endParaRPr lang="en-US" sz="2200" dirty="0"/>
           </a:p>
@@ -20698,27 +20619,8 @@
           <a:lstStyle/>
           <a:p>
             <a:r>
-              <a:rPr lang="en-US" dirty="0"/>
-              <a:t>You can measure the speed of the built-in function </a:t>
-            </a:r>
-            <a:r>
-              <a:rPr lang="en-US" u="sng" dirty="0"/>
-              <a:t>abs</a:t>
-            </a:r>
-            <a:r>
-              <a:rPr lang="en-US" dirty="0"/>
-              <a:t> with </a:t>
-            </a:r>
-            <a:r>
-              <a:rPr lang="en-US" dirty="0" err="1"/>
-              <a:t>system.time</a:t>
-            </a:r>
-            <a:endParaRPr lang="en-US" dirty="0"/>
-          </a:p>
-          <a:p>
-            <a:r>
-              <a:rPr lang="en-US" dirty="0"/>
-              <a:t>It takes abs 0.26 seconds to calculate the absolute value of 100 million numbers</a:t>
+              <a:rPr lang="en-US" sz="2400"/>
+              <a:t>You can measure the speed of a built-in function (e.g. abs()) with system.time</a:t>
             </a:r>
           </a:p>
           <a:p>
@@ -20729,25 +20631,11 @@
               <a:buNone/>
             </a:pPr>
             <a:r>
-              <a:rPr lang="en-US" sz="2400" dirty="0">
-                <a:latin typeface="Courier New" panose="02070309020205020404" pitchFamily="49" charset="0"/>
-                <a:cs typeface="Courier New" panose="02070309020205020404" pitchFamily="49" charset="0"/>
-              </a:rPr>
-              <a:t>&gt; </a:t>
-            </a:r>
-            <a:r>
-              <a:rPr lang="en-US" sz="2400" dirty="0" err="1">
-                <a:latin typeface="Courier New" panose="02070309020205020404" pitchFamily="49" charset="0"/>
-                <a:cs typeface="Courier New" panose="02070309020205020404" pitchFamily="49" charset="0"/>
-              </a:rPr>
-              <a:t>system.time</a:t>
-            </a:r>
-            <a:r>
-              <a:rPr lang="en-US" sz="2400" dirty="0">
-                <a:latin typeface="Courier New" panose="02070309020205020404" pitchFamily="49" charset="0"/>
-                <a:cs typeface="Courier New" panose="02070309020205020404" pitchFamily="49" charset="0"/>
-              </a:rPr>
-              <a:t>(abs(long))</a:t>
+              <a:rPr lang="en-US" sz="2400">
+                <a:latin typeface="Courier New" panose="02070309020205020404" pitchFamily="49" charset="0"/>
+                <a:cs typeface="Courier New" panose="02070309020205020404" pitchFamily="49" charset="0"/>
+              </a:rPr>
+              <a:t>&gt; system.time(abs(long))</a:t>
             </a:r>
           </a:p>
           <a:p>
@@ -20755,7 +20643,7 @@
               <a:buNone/>
             </a:pPr>
             <a:r>
-              <a:rPr lang="en-US" sz="2400" dirty="0">
+              <a:rPr lang="en-US" sz="2400">
                 <a:latin typeface="Courier New" panose="02070309020205020404" pitchFamily="49" charset="0"/>
                 <a:cs typeface="Courier New" panose="02070309020205020404" pitchFamily="49" charset="0"/>
               </a:rPr>
@@ -20767,11 +20655,11 @@
               <a:buNone/>
             </a:pPr>
             <a:r>
-              <a:rPr lang="en-US" sz="2400" dirty="0">
-                <a:latin typeface="Courier New" panose="02070309020205020404" pitchFamily="49" charset="0"/>
-                <a:cs typeface="Courier New" panose="02070309020205020404" pitchFamily="49" charset="0"/>
-              </a:rPr>
-              <a:t>   0.20    0.06    0.26</a:t>
+              <a:rPr lang="en-US" sz="2400">
+                <a:latin typeface="Courier New" panose="02070309020205020404" pitchFamily="49" charset="0"/>
+                <a:cs typeface="Courier New" panose="02070309020205020404" pitchFamily="49" charset="0"/>
+              </a:rPr>
+              <a:t>   0.08    0.10    0.18 </a:t>
             </a:r>
           </a:p>
           <a:p>
@@ -20783,8 +20671,19 @@
           <a:p>
             <a:pPr marL="344488" indent="-225425"/>
             <a:r>
+              <a:rPr lang="en-US" sz="2400"/>
+              <a:t>Note that both custom functions are slower than the built-in.</a:t>
+            </a:r>
+          </a:p>
+          <a:p>
+            <a:pPr marL="344488" indent="-225425"/>
+            <a:r>
+              <a:rPr lang="en-US" sz="2400"/>
+              <a:t>Built-in </a:t>
+            </a:r>
+            <a:r>
               <a:rPr lang="en-US" sz="2400" dirty="0"/>
-              <a:t>Built-in functions are optimized in R and should be used when available for the best performance</a:t>
+              <a:t>functions are optimized in R and should be used when available for the best performance</a:t>
             </a:r>
           </a:p>
         </p:txBody>

</xml_diff>